<commit_message>
update to chapter 23
</commit_message>
<xml_diff>
--- a/MySQL实战/01基础架构：一条SQL查询语句是如何执行的？.pptx
+++ b/MySQL实战/01基础架构：一条SQL查询语句是如何执行的？.pptx
@@ -304,7 +304,7 @@
           <a:p>
             <a:fld id="{E396512D-F96B-4538-B91A-F7EB57A489A0}" type="datetimeFigureOut">
               <a:rPr lang="zh-CN" altLang="en-US" smtClean="0"/>
-              <a:t>2019/5/8</a:t>
+              <a:t>2019/5/26</a:t>
             </a:fld>
             <a:endParaRPr lang="zh-CN" altLang="en-US"/>
           </a:p>
@@ -579,7 +579,7 @@
           <a:p>
             <a:fld id="{E396512D-F96B-4538-B91A-F7EB57A489A0}" type="datetimeFigureOut">
               <a:rPr lang="zh-CN" altLang="en-US" smtClean="0"/>
-              <a:t>2019/5/8</a:t>
+              <a:t>2019/5/26</a:t>
             </a:fld>
             <a:endParaRPr lang="zh-CN" altLang="en-US"/>
           </a:p>
@@ -773,7 +773,7 @@
           <a:p>
             <a:fld id="{E396512D-F96B-4538-B91A-F7EB57A489A0}" type="datetimeFigureOut">
               <a:rPr lang="zh-CN" altLang="en-US" smtClean="0"/>
-              <a:t>2019/5/8</a:t>
+              <a:t>2019/5/26</a:t>
             </a:fld>
             <a:endParaRPr lang="zh-CN" altLang="en-US"/>
           </a:p>
@@ -1046,7 +1046,7 @@
           <a:p>
             <a:fld id="{E396512D-F96B-4538-B91A-F7EB57A489A0}" type="datetimeFigureOut">
               <a:rPr lang="zh-CN" altLang="en-US" smtClean="0"/>
-              <a:t>2019/5/8</a:t>
+              <a:t>2019/5/26</a:t>
             </a:fld>
             <a:endParaRPr lang="zh-CN" altLang="en-US"/>
           </a:p>
@@ -1387,7 +1387,7 @@
           <a:p>
             <a:fld id="{E396512D-F96B-4538-B91A-F7EB57A489A0}" type="datetimeFigureOut">
               <a:rPr lang="zh-CN" altLang="en-US" smtClean="0"/>
-              <a:t>2019/5/8</a:t>
+              <a:t>2019/5/26</a:t>
             </a:fld>
             <a:endParaRPr lang="zh-CN" altLang="en-US"/>
           </a:p>
@@ -2010,7 +2010,7 @@
           <a:p>
             <a:fld id="{E396512D-F96B-4538-B91A-F7EB57A489A0}" type="datetimeFigureOut">
               <a:rPr lang="zh-CN" altLang="en-US" smtClean="0"/>
-              <a:t>2019/5/8</a:t>
+              <a:t>2019/5/26</a:t>
             </a:fld>
             <a:endParaRPr lang="zh-CN" altLang="en-US"/>
           </a:p>
@@ -2870,7 +2870,7 @@
           <a:p>
             <a:fld id="{E396512D-F96B-4538-B91A-F7EB57A489A0}" type="datetimeFigureOut">
               <a:rPr lang="zh-CN" altLang="en-US" smtClean="0"/>
-              <a:t>2019/5/8</a:t>
+              <a:t>2019/5/26</a:t>
             </a:fld>
             <a:endParaRPr lang="zh-CN" altLang="en-US"/>
           </a:p>
@@ -3040,7 +3040,7 @@
           <a:p>
             <a:fld id="{E396512D-F96B-4538-B91A-F7EB57A489A0}" type="datetimeFigureOut">
               <a:rPr lang="zh-CN" altLang="en-US" smtClean="0"/>
-              <a:t>2019/5/8</a:t>
+              <a:t>2019/5/26</a:t>
             </a:fld>
             <a:endParaRPr lang="zh-CN" altLang="en-US"/>
           </a:p>
@@ -3220,7 +3220,7 @@
           <a:p>
             <a:fld id="{E396512D-F96B-4538-B91A-F7EB57A489A0}" type="datetimeFigureOut">
               <a:rPr lang="zh-CN" altLang="en-US" smtClean="0"/>
-              <a:t>2019/5/8</a:t>
+              <a:t>2019/5/26</a:t>
             </a:fld>
             <a:endParaRPr lang="zh-CN" altLang="en-US"/>
           </a:p>
@@ -3390,7 +3390,7 @@
           <a:p>
             <a:fld id="{E396512D-F96B-4538-B91A-F7EB57A489A0}" type="datetimeFigureOut">
               <a:rPr lang="zh-CN" altLang="en-US" smtClean="0"/>
-              <a:t>2019/5/8</a:t>
+              <a:t>2019/5/26</a:t>
             </a:fld>
             <a:endParaRPr lang="zh-CN" altLang="en-US"/>
           </a:p>
@@ -3637,7 +3637,7 @@
           <a:p>
             <a:fld id="{E396512D-F96B-4538-B91A-F7EB57A489A0}" type="datetimeFigureOut">
               <a:rPr lang="zh-CN" altLang="en-US" smtClean="0"/>
-              <a:t>2019/5/8</a:t>
+              <a:t>2019/5/26</a:t>
             </a:fld>
             <a:endParaRPr lang="zh-CN" altLang="en-US"/>
           </a:p>
@@ -3929,7 +3929,7 @@
           <a:p>
             <a:fld id="{E396512D-F96B-4538-B91A-F7EB57A489A0}" type="datetimeFigureOut">
               <a:rPr lang="zh-CN" altLang="en-US" smtClean="0"/>
-              <a:t>2019/5/8</a:t>
+              <a:t>2019/5/26</a:t>
             </a:fld>
             <a:endParaRPr lang="zh-CN" altLang="en-US"/>
           </a:p>
@@ -4373,7 +4373,7 @@
           <a:p>
             <a:fld id="{E396512D-F96B-4538-B91A-F7EB57A489A0}" type="datetimeFigureOut">
               <a:rPr lang="zh-CN" altLang="en-US" smtClean="0"/>
-              <a:t>2019/5/8</a:t>
+              <a:t>2019/5/26</a:t>
             </a:fld>
             <a:endParaRPr lang="zh-CN" altLang="en-US"/>
           </a:p>
@@ -4491,7 +4491,7 @@
           <a:p>
             <a:fld id="{E396512D-F96B-4538-B91A-F7EB57A489A0}" type="datetimeFigureOut">
               <a:rPr lang="zh-CN" altLang="en-US" smtClean="0"/>
-              <a:t>2019/5/8</a:t>
+              <a:t>2019/5/26</a:t>
             </a:fld>
             <a:endParaRPr lang="zh-CN" altLang="en-US"/>
           </a:p>
@@ -4586,7 +4586,7 @@
           <a:p>
             <a:fld id="{E396512D-F96B-4538-B91A-F7EB57A489A0}" type="datetimeFigureOut">
               <a:rPr lang="zh-CN" altLang="en-US" smtClean="0"/>
-              <a:t>2019/5/8</a:t>
+              <a:t>2019/5/26</a:t>
             </a:fld>
             <a:endParaRPr lang="zh-CN" altLang="en-US"/>
           </a:p>
@@ -4865,7 +4865,7 @@
           <a:p>
             <a:fld id="{E396512D-F96B-4538-B91A-F7EB57A489A0}" type="datetimeFigureOut">
               <a:rPr lang="zh-CN" altLang="en-US" smtClean="0"/>
-              <a:t>2019/5/8</a:t>
+              <a:t>2019/5/26</a:t>
             </a:fld>
             <a:endParaRPr lang="zh-CN" altLang="en-US"/>
           </a:p>
@@ -5140,7 +5140,7 @@
           <a:p>
             <a:fld id="{E396512D-F96B-4538-B91A-F7EB57A489A0}" type="datetimeFigureOut">
               <a:rPr lang="zh-CN" altLang="en-US" smtClean="0"/>
-              <a:t>2019/5/8</a:t>
+              <a:t>2019/5/26</a:t>
             </a:fld>
             <a:endParaRPr lang="zh-CN" altLang="en-US"/>
           </a:p>
@@ -5569,7 +5569,7 @@
           <a:p>
             <a:fld id="{E396512D-F96B-4538-B91A-F7EB57A489A0}" type="datetimeFigureOut">
               <a:rPr lang="zh-CN" altLang="en-US" smtClean="0"/>
-              <a:t>2019/5/8</a:t>
+              <a:t>2019/5/26</a:t>
             </a:fld>
             <a:endParaRPr lang="zh-CN" altLang="en-US"/>
           </a:p>
@@ -8808,10 +8808,6 @@
               </a:rPr>
               <a:t>不支持查询缓存。</a:t>
             </a:r>
-            <a:endParaRPr lang="zh-CN" altLang="en-US" sz="1400" dirty="0">
-              <a:latin typeface="微软雅黑" panose="020B0503020204020204" pitchFamily="34" charset="-122"/>
-              <a:ea typeface="微软雅黑" panose="020B0503020204020204" pitchFamily="34" charset="-122"/>
-            </a:endParaRPr>
           </a:p>
         </p:txBody>
       </p:sp>

</xml_diff>